<commit_message>
compare script added and GUI setup and readme
</commit_message>
<xml_diff>
--- a/splash/splash_logo.pptx
+++ b/splash/splash_logo.pptx
@@ -261,7 +261,7 @@
           <a:p>
             <a:fld id="{E6D1F9A3-B9DD-4CA0-8671-68979F0648A8}" type="datetimeFigureOut">
               <a:rPr lang="en-UG" smtClean="0"/>
-              <a:t>27/06/2024</a:t>
+              <a:t>13/05/2025</a:t>
             </a:fld>
             <a:endParaRPr lang="en-UG"/>
           </a:p>
@@ -461,7 +461,7 @@
           <a:p>
             <a:fld id="{E6D1F9A3-B9DD-4CA0-8671-68979F0648A8}" type="datetimeFigureOut">
               <a:rPr lang="en-UG" smtClean="0"/>
-              <a:t>27/06/2024</a:t>
+              <a:t>13/05/2025</a:t>
             </a:fld>
             <a:endParaRPr lang="en-UG"/>
           </a:p>
@@ -671,7 +671,7 @@
           <a:p>
             <a:fld id="{E6D1F9A3-B9DD-4CA0-8671-68979F0648A8}" type="datetimeFigureOut">
               <a:rPr lang="en-UG" smtClean="0"/>
-              <a:t>27/06/2024</a:t>
+              <a:t>13/05/2025</a:t>
             </a:fld>
             <a:endParaRPr lang="en-UG"/>
           </a:p>
@@ -871,7 +871,7 @@
           <a:p>
             <a:fld id="{E6D1F9A3-B9DD-4CA0-8671-68979F0648A8}" type="datetimeFigureOut">
               <a:rPr lang="en-UG" smtClean="0"/>
-              <a:t>27/06/2024</a:t>
+              <a:t>13/05/2025</a:t>
             </a:fld>
             <a:endParaRPr lang="en-UG"/>
           </a:p>
@@ -1147,7 +1147,7 @@
           <a:p>
             <a:fld id="{E6D1F9A3-B9DD-4CA0-8671-68979F0648A8}" type="datetimeFigureOut">
               <a:rPr lang="en-UG" smtClean="0"/>
-              <a:t>27/06/2024</a:t>
+              <a:t>13/05/2025</a:t>
             </a:fld>
             <a:endParaRPr lang="en-UG"/>
           </a:p>
@@ -1415,7 +1415,7 @@
           <a:p>
             <a:fld id="{E6D1F9A3-B9DD-4CA0-8671-68979F0648A8}" type="datetimeFigureOut">
               <a:rPr lang="en-UG" smtClean="0"/>
-              <a:t>27/06/2024</a:t>
+              <a:t>13/05/2025</a:t>
             </a:fld>
             <a:endParaRPr lang="en-UG"/>
           </a:p>
@@ -1830,7 +1830,7 @@
           <a:p>
             <a:fld id="{E6D1F9A3-B9DD-4CA0-8671-68979F0648A8}" type="datetimeFigureOut">
               <a:rPr lang="en-UG" smtClean="0"/>
-              <a:t>27/06/2024</a:t>
+              <a:t>13/05/2025</a:t>
             </a:fld>
             <a:endParaRPr lang="en-UG"/>
           </a:p>
@@ -1972,7 +1972,7 @@
           <a:p>
             <a:fld id="{E6D1F9A3-B9DD-4CA0-8671-68979F0648A8}" type="datetimeFigureOut">
               <a:rPr lang="en-UG" smtClean="0"/>
-              <a:t>27/06/2024</a:t>
+              <a:t>13/05/2025</a:t>
             </a:fld>
             <a:endParaRPr lang="en-UG"/>
           </a:p>
@@ -2085,7 +2085,7 @@
           <a:p>
             <a:fld id="{E6D1F9A3-B9DD-4CA0-8671-68979F0648A8}" type="datetimeFigureOut">
               <a:rPr lang="en-UG" smtClean="0"/>
-              <a:t>27/06/2024</a:t>
+              <a:t>13/05/2025</a:t>
             </a:fld>
             <a:endParaRPr lang="en-UG"/>
           </a:p>
@@ -2398,7 +2398,7 @@
           <a:p>
             <a:fld id="{E6D1F9A3-B9DD-4CA0-8671-68979F0648A8}" type="datetimeFigureOut">
               <a:rPr lang="en-UG" smtClean="0"/>
-              <a:t>27/06/2024</a:t>
+              <a:t>13/05/2025</a:t>
             </a:fld>
             <a:endParaRPr lang="en-UG"/>
           </a:p>
@@ -2687,7 +2687,7 @@
           <a:p>
             <a:fld id="{E6D1F9A3-B9DD-4CA0-8671-68979F0648A8}" type="datetimeFigureOut">
               <a:rPr lang="en-UG" smtClean="0"/>
-              <a:t>27/06/2024</a:t>
+              <a:t>13/05/2025</a:t>
             </a:fld>
             <a:endParaRPr lang="en-UG"/>
           </a:p>
@@ -2930,7 +2930,7 @@
           <a:p>
             <a:fld id="{E6D1F9A3-B9DD-4CA0-8671-68979F0648A8}" type="datetimeFigureOut">
               <a:rPr lang="en-UG" smtClean="0"/>
-              <a:t>27/06/2024</a:t>
+              <a:t>13/05/2025</a:t>
             </a:fld>
             <a:endParaRPr lang="en-UG"/>
           </a:p>
@@ -3430,8 +3430,8 @@
           </p:nvSpPr>
           <p:spPr>
             <a:xfrm>
-              <a:off x="7862208" y="4139897"/>
-              <a:ext cx="1618342" cy="461665"/>
+              <a:off x="7862207" y="4139897"/>
+              <a:ext cx="1885949" cy="461665"/>
             </a:xfrm>
             <a:prstGeom prst="rect">
               <a:avLst/>
@@ -3446,26 +3446,13 @@
             <a:p>
               <a:pPr algn="r"/>
               <a:r>
-                <a:rPr lang="es-ES" sz="1200" dirty="0" err="1">
+                <a:rPr lang="en-US" sz="1200" noProof="0" dirty="0">
                   <a:solidFill>
                     <a:schemeClr val="bg1"/>
                   </a:solidFill>
                 </a:rPr>
-                <a:t>Version</a:t>
+                <a:t>Version 2.1 (Sharp Scale) 2025-05-13</a:t>
               </a:r>
-              <a:r>
-                <a:rPr lang="es-ES" sz="1200" dirty="0">
-                  <a:solidFill>
-                    <a:schemeClr val="bg1"/>
-                  </a:solidFill>
-                </a:rPr>
-                <a:t> 2.0 (Long Gill) 2024-06-27</a:t>
-              </a:r>
-              <a:endParaRPr lang="en-UG" sz="1200" dirty="0">
-                <a:solidFill>
-                  <a:schemeClr val="bg1"/>
-                </a:solidFill>
-              </a:endParaRPr>
             </a:p>
           </p:txBody>
         </p:sp>

</xml_diff>